<commit_message>
Adiciona extensoes dos arquivos de entrega
</commit_message>
<xml_diff>
--- a/SpMedGroup/PROJETO DE BANCO DE DADOS.pptx
+++ b/SpMedGroup/PROJETO DE BANCO DE DADOS.pptx
@@ -338,7 +338,7 @@
             <a:fld id="{5586B75A-687E-405C-8A0B-8D00578BA2C3}" type="datetimeFigureOut">
               <a:rPr lang="en-US" dirty="0"/>
               <a:pPr/>
-              <a:t>2/10/2020</a:t>
+              <a:t>2/11/2020</a:t>
             </a:fld>
             <a:endParaRPr lang="en-US" dirty="0"/>
           </a:p>
@@ -505,7 +505,7 @@
             <a:fld id="{5586B75A-687E-405C-8A0B-8D00578BA2C3}" type="datetimeFigureOut">
               <a:rPr lang="en-US" dirty="0"/>
               <a:pPr/>
-              <a:t>2/10/2020</a:t>
+              <a:t>2/11/2020</a:t>
             </a:fld>
             <a:endParaRPr lang="en-US" dirty="0"/>
           </a:p>
@@ -682,7 +682,7 @@
             <a:fld id="{5586B75A-687E-405C-8A0B-8D00578BA2C3}" type="datetimeFigureOut">
               <a:rPr lang="en-US" dirty="0"/>
               <a:pPr/>
-              <a:t>2/10/2020</a:t>
+              <a:t>2/11/2020</a:t>
             </a:fld>
             <a:endParaRPr lang="en-US" dirty="0"/>
           </a:p>
@@ -849,7 +849,7 @@
             <a:fld id="{5586B75A-687E-405C-8A0B-8D00578BA2C3}" type="datetimeFigureOut">
               <a:rPr lang="en-US" dirty="0"/>
               <a:pPr/>
-              <a:t>2/10/2020</a:t>
+              <a:t>2/11/2020</a:t>
             </a:fld>
             <a:endParaRPr lang="en-US" dirty="0"/>
           </a:p>
@@ -1104,7 +1104,7 @@
             <a:fld id="{5586B75A-687E-405C-8A0B-8D00578BA2C3}" type="datetimeFigureOut">
               <a:rPr lang="en-US" dirty="0"/>
               <a:pPr/>
-              <a:t>2/10/2020</a:t>
+              <a:t>2/11/2020</a:t>
             </a:fld>
             <a:endParaRPr lang="en-US" dirty="0"/>
           </a:p>
@@ -1389,7 +1389,7 @@
             <a:fld id="{5586B75A-687E-405C-8A0B-8D00578BA2C3}" type="datetimeFigureOut">
               <a:rPr lang="en-US" dirty="0"/>
               <a:pPr/>
-              <a:t>2/10/2020</a:t>
+              <a:t>2/11/2020</a:t>
             </a:fld>
             <a:endParaRPr lang="en-US" dirty="0"/>
           </a:p>
@@ -1828,7 +1828,7 @@
             <a:fld id="{5586B75A-687E-405C-8A0B-8D00578BA2C3}" type="datetimeFigureOut">
               <a:rPr lang="en-US" dirty="0"/>
               <a:pPr/>
-              <a:t>2/10/2020</a:t>
+              <a:t>2/11/2020</a:t>
             </a:fld>
             <a:endParaRPr lang="en-US" dirty="0"/>
           </a:p>
@@ -1943,7 +1943,7 @@
             <a:fld id="{5586B75A-687E-405C-8A0B-8D00578BA2C3}" type="datetimeFigureOut">
               <a:rPr lang="en-US" dirty="0"/>
               <a:pPr/>
-              <a:t>2/10/2020</a:t>
+              <a:t>2/11/2020</a:t>
             </a:fld>
             <a:endParaRPr lang="en-US" dirty="0"/>
           </a:p>
@@ -2035,7 +2035,7 @@
             <a:fld id="{5586B75A-687E-405C-8A0B-8D00578BA2C3}" type="datetimeFigureOut">
               <a:rPr lang="en-US" dirty="0"/>
               <a:pPr/>
-              <a:t>2/10/2020</a:t>
+              <a:t>2/11/2020</a:t>
             </a:fld>
             <a:endParaRPr lang="en-US" dirty="0"/>
           </a:p>
@@ -2320,7 +2320,7 @@
             <a:fld id="{5586B75A-687E-405C-8A0B-8D00578BA2C3}" type="datetimeFigureOut">
               <a:rPr lang="en-US" dirty="0"/>
               <a:pPr/>
-              <a:t>2/10/2020</a:t>
+              <a:t>2/11/2020</a:t>
             </a:fld>
             <a:endParaRPr lang="en-US" dirty="0"/>
           </a:p>
@@ -2590,7 +2590,7 @@
             <a:fld id="{5586B75A-687E-405C-8A0B-8D00578BA2C3}" type="datetimeFigureOut">
               <a:rPr lang="en-US" dirty="0"/>
               <a:pPr/>
-              <a:t>2/10/2020</a:t>
+              <a:t>2/11/2020</a:t>
             </a:fld>
             <a:endParaRPr lang="en-US" dirty="0"/>
           </a:p>
@@ -2884,7 +2884,7 @@
             <a:fld id="{5586B75A-687E-405C-8A0B-8D00578BA2C3}" type="datetimeFigureOut">
               <a:rPr lang="en-US" dirty="0"/>
               <a:pPr/>
-              <a:t>2/10/2020</a:t>
+              <a:t>2/11/2020</a:t>
             </a:fld>
             <a:endParaRPr lang="en-US" dirty="0"/>
           </a:p>
@@ -3545,8 +3545,8 @@
         </p:nvSpPr>
         <p:spPr>
           <a:xfrm>
-            <a:off x="3844032" y="-106534"/>
-            <a:ext cx="7736984" cy="6653814"/>
+            <a:off x="3622091" y="-106534"/>
+            <a:ext cx="8140822" cy="6653814"/>
           </a:xfrm>
         </p:spPr>
         <p:txBody>
@@ -3568,15 +3568,7 @@
             </a:pPr>
             <a:r>
               <a:rPr lang="pt-BR" sz="2500" b="1" dirty="0"/>
-              <a:t>CONTROLE DE TAREFAS (</a:t>
-            </a:r>
-            <a:r>
-              <a:rPr lang="pt-BR" sz="2500" b="1" dirty="0" err="1"/>
-              <a:t>Trello</a:t>
-            </a:r>
-            <a:r>
-              <a:rPr lang="pt-BR" sz="2500" b="1" dirty="0"/>
-              <a:t>)</a:t>
+              <a:t>CONTROLE DE TAREFAS (Trello)</a:t>
             </a:r>
           </a:p>
           <a:p>
@@ -3596,7 +3588,7 @@
             </a:pPr>
             <a:r>
               <a:rPr lang="pt-BR" sz="2500" dirty="0"/>
-              <a:t>CONCEITUAL </a:t>
+              <a:t>CONCEITUAL (.png/.drawio)</a:t>
             </a:r>
           </a:p>
           <a:p>
@@ -3606,7 +3598,7 @@
             </a:pPr>
             <a:r>
               <a:rPr lang="pt-BR" sz="2500" dirty="0"/>
-              <a:t>LÓGICO </a:t>
+              <a:t>LÓGICO (.png/.drawio)</a:t>
             </a:r>
           </a:p>
           <a:p>
@@ -3616,7 +3608,7 @@
             </a:pPr>
             <a:r>
               <a:rPr lang="pt-BR" sz="2500" dirty="0"/>
-              <a:t>FÍSICO </a:t>
+              <a:t>FÍSICO (diagrama do SSMS em .png/.pdf)</a:t>
             </a:r>
           </a:p>
           <a:p>
@@ -3636,7 +3628,7 @@
             </a:pPr>
             <a:r>
               <a:rPr lang="pt-BR" sz="2500" dirty="0"/>
-              <a:t>DDL</a:t>
+              <a:t>DDL (spmedgroup-01-DDL.sql)</a:t>
             </a:r>
           </a:p>
           <a:p>
@@ -3646,7 +3638,7 @@
             </a:pPr>
             <a:r>
               <a:rPr lang="pt-BR" sz="2500" dirty="0"/>
-              <a:t>DML </a:t>
+              <a:t>DML (spmedgroup-02-DML.sql)</a:t>
             </a:r>
           </a:p>
           <a:p>
@@ -3656,7 +3648,7 @@
             </a:pPr>
             <a:r>
               <a:rPr lang="pt-BR" sz="2500" dirty="0"/>
-              <a:t>DQL</a:t>
+              <a:t>DQL (spmedgroup-03-DQL.sql)</a:t>
             </a:r>
             <a:endParaRPr lang="pt-BR" sz="2500" b="1" dirty="0"/>
           </a:p>
@@ -3688,16 +3680,13 @@
             </a:pPr>
             <a:r>
               <a:rPr lang="pt-BR" sz="2500" dirty="0"/>
-              <a:t>SUBIR NO GIT UM REPOSITÓRIO COM O NOME </a:t>
+              <a:t>SUBIR OS ARQUIVOS DO PROJETO EM UM REPOSITÓRIO NO GITHUB COM O NOME </a:t>
             </a:r>
             <a:r>
               <a:rPr lang="pt-BR" sz="2500" b="1" dirty="0"/>
-              <a:t>senai_spmedgroup_sprint1_bd_tarde_seunome </a:t>
-            </a:r>
-            <a:r>
-              <a:rPr lang="pt-BR" sz="2500" dirty="0"/>
-              <a:t>COM OS ARQUIVOS DO PROJETO. </a:t>
-            </a:r>
+              <a:t>senai_spmedgroup_sprint1_bd_periodo_seunome</a:t>
+            </a:r>
+            <a:endParaRPr lang="pt-BR" sz="2500" dirty="0"/>
           </a:p>
         </p:txBody>
       </p:sp>

</xml_diff>